<commit_message>
Update Deploying Windows 10 With MDT - Intro Slides.pptx
</commit_message>
<xml_diff>
--- a/Deploying Windows 10 With MDT - Intro Slides.pptx
+++ b/Deploying Windows 10 With MDT - Intro Slides.pptx
@@ -247,7 +247,7 @@
           <a:p>
             <a:fld id="{603F06EE-F07F-4A2D-9CB8-B5E6AC9AF85B}" type="datetimeFigureOut">
               <a:rPr lang="en-US" smtClean="0"/>
-              <a:t>10/24/2018</a:t>
+              <a:t>10/29/2018</a:t>
             </a:fld>
             <a:endParaRPr lang="en-US"/>
           </a:p>
@@ -417,7 +417,7 @@
           <a:p>
             <a:fld id="{603F06EE-F07F-4A2D-9CB8-B5E6AC9AF85B}" type="datetimeFigureOut">
               <a:rPr lang="en-US" smtClean="0"/>
-              <a:t>10/24/2018</a:t>
+              <a:t>10/29/2018</a:t>
             </a:fld>
             <a:endParaRPr lang="en-US"/>
           </a:p>
@@ -597,7 +597,7 @@
           <a:p>
             <a:fld id="{603F06EE-F07F-4A2D-9CB8-B5E6AC9AF85B}" type="datetimeFigureOut">
               <a:rPr lang="en-US" smtClean="0"/>
-              <a:t>10/24/2018</a:t>
+              <a:t>10/29/2018</a:t>
             </a:fld>
             <a:endParaRPr lang="en-US"/>
           </a:p>
@@ -767,7 +767,7 @@
           <a:p>
             <a:fld id="{603F06EE-F07F-4A2D-9CB8-B5E6AC9AF85B}" type="datetimeFigureOut">
               <a:rPr lang="en-US" smtClean="0"/>
-              <a:t>10/24/2018</a:t>
+              <a:t>10/29/2018</a:t>
             </a:fld>
             <a:endParaRPr lang="en-US"/>
           </a:p>
@@ -1013,7 +1013,7 @@
           <a:p>
             <a:fld id="{603F06EE-F07F-4A2D-9CB8-B5E6AC9AF85B}" type="datetimeFigureOut">
               <a:rPr lang="en-US" smtClean="0"/>
-              <a:t>10/24/2018</a:t>
+              <a:t>10/29/2018</a:t>
             </a:fld>
             <a:endParaRPr lang="en-US"/>
           </a:p>
@@ -1245,7 +1245,7 @@
           <a:p>
             <a:fld id="{603F06EE-F07F-4A2D-9CB8-B5E6AC9AF85B}" type="datetimeFigureOut">
               <a:rPr lang="en-US" smtClean="0"/>
-              <a:t>10/24/2018</a:t>
+              <a:t>10/29/2018</a:t>
             </a:fld>
             <a:endParaRPr lang="en-US"/>
           </a:p>
@@ -1612,7 +1612,7 @@
           <a:p>
             <a:fld id="{603F06EE-F07F-4A2D-9CB8-B5E6AC9AF85B}" type="datetimeFigureOut">
               <a:rPr lang="en-US" smtClean="0"/>
-              <a:t>10/24/2018</a:t>
+              <a:t>10/29/2018</a:t>
             </a:fld>
             <a:endParaRPr lang="en-US"/>
           </a:p>
@@ -1730,7 +1730,7 @@
           <a:p>
             <a:fld id="{603F06EE-F07F-4A2D-9CB8-B5E6AC9AF85B}" type="datetimeFigureOut">
               <a:rPr lang="en-US" smtClean="0"/>
-              <a:t>10/24/2018</a:t>
+              <a:t>10/29/2018</a:t>
             </a:fld>
             <a:endParaRPr lang="en-US"/>
           </a:p>
@@ -1825,7 +1825,7 @@
           <a:p>
             <a:fld id="{603F06EE-F07F-4A2D-9CB8-B5E6AC9AF85B}" type="datetimeFigureOut">
               <a:rPr lang="en-US" smtClean="0"/>
-              <a:t>10/24/2018</a:t>
+              <a:t>10/29/2018</a:t>
             </a:fld>
             <a:endParaRPr lang="en-US"/>
           </a:p>
@@ -2102,7 +2102,7 @@
           <a:p>
             <a:fld id="{603F06EE-F07F-4A2D-9CB8-B5E6AC9AF85B}" type="datetimeFigureOut">
               <a:rPr lang="en-US" smtClean="0"/>
-              <a:t>10/24/2018</a:t>
+              <a:t>10/29/2018</a:t>
             </a:fld>
             <a:endParaRPr lang="en-US"/>
           </a:p>
@@ -2355,7 +2355,7 @@
           <a:p>
             <a:fld id="{603F06EE-F07F-4A2D-9CB8-B5E6AC9AF85B}" type="datetimeFigureOut">
               <a:rPr lang="en-US" smtClean="0"/>
-              <a:t>10/24/2018</a:t>
+              <a:t>10/29/2018</a:t>
             </a:fld>
             <a:endParaRPr lang="en-US"/>
           </a:p>
@@ -2568,7 +2568,7 @@
           <a:p>
             <a:fld id="{603F06EE-F07F-4A2D-9CB8-B5E6AC9AF85B}" type="datetimeFigureOut">
               <a:rPr lang="en-US" smtClean="0"/>
-              <a:t>10/24/2018</a:t>
+              <a:t>10/29/2018</a:t>
             </a:fld>
             <a:endParaRPr lang="en-US"/>
           </a:p>
@@ -3126,17 +3126,11 @@
             </a:r>
             <a:r>
               <a:rPr lang="en-US" dirty="0" err="1" smtClean="0"/>
-              <a:t>VExpert</a:t>
-            </a:r>
-            <a:r>
-              <a:rPr lang="en-US" dirty="0" smtClean="0"/>
-              <a:t> with</a:t>
-            </a:r>
-          </a:p>
-          <a:p>
-            <a:pPr marL="0" indent="0">
-              <a:buNone/>
-            </a:pPr>
+              <a:t>Vexpert</a:t>
+            </a:r>
+            <a:endParaRPr lang="en-US" dirty="0" smtClean="0"/>
+          </a:p>
+          <a:p>
             <a:endParaRPr lang="en-US" dirty="0"/>
           </a:p>
           <a:p>
@@ -3244,15 +3238,7 @@
           <a:p>
             <a:r>
               <a:rPr lang="en-US" dirty="0" smtClean="0"/>
-              <a:t>Stand on the </a:t>
-            </a:r>
-            <a:r>
-              <a:rPr lang="en-US" dirty="0" smtClean="0"/>
-              <a:t>shoulders </a:t>
-            </a:r>
-            <a:r>
-              <a:rPr lang="en-US" dirty="0" smtClean="0"/>
-              <a:t>of others</a:t>
+              <a:t>Stand on the shoulders of others</a:t>
             </a:r>
             <a:endParaRPr lang="en-US" dirty="0"/>
           </a:p>

</xml_diff>